<commit_message>
chore: add cod exemplo 5 no ppt
</commit_message>
<xml_diff>
--- a/atividade1.pptx
+++ b/atividade1.pptx
@@ -5,7 +5,7 @@
     <p:sldMasterId id="2147483648" r:id="rId1"/>
   </p:sldMasterIdLst>
   <p:notesMasterIdLst>
-    <p:notesMasterId r:id="rId11"/>
+    <p:notesMasterId r:id="rId12"/>
   </p:notesMasterIdLst>
   <p:sldIdLst>
     <p:sldId id="256" r:id="rId2"/>
@@ -16,29 +16,30 @@
     <p:sldId id="363" r:id="rId7"/>
     <p:sldId id="364" r:id="rId8"/>
     <p:sldId id="365" r:id="rId9"/>
-    <p:sldId id="315" r:id="rId10"/>
+    <p:sldId id="366" r:id="rId10"/>
+    <p:sldId id="315" r:id="rId11"/>
   </p:sldIdLst>
   <p:sldSz cx="18288000" cy="10287000"/>
   <p:notesSz cx="6858000" cy="9144000"/>
   <p:embeddedFontLst>
     <p:embeddedFont>
       <p:font typeface="Calibri" panose="020F0502020204030204" pitchFamily="34" charset="0"/>
-      <p:regular r:id="rId12"/>
-      <p:bold r:id="rId13"/>
-      <p:italic r:id="rId14"/>
-      <p:boldItalic r:id="rId15"/>
+      <p:regular r:id="rId13"/>
+      <p:bold r:id="rId14"/>
+      <p:italic r:id="rId15"/>
+      <p:boldItalic r:id="rId16"/>
     </p:embeddedFont>
     <p:embeddedFont>
       <p:font typeface="Public Sans" panose="020B0604020202020204" charset="0"/>
-      <p:regular r:id="rId16"/>
+      <p:regular r:id="rId17"/>
     </p:embeddedFont>
     <p:embeddedFont>
       <p:font typeface="Public Sans Bold" panose="020B0604020202020204" charset="0"/>
-      <p:regular r:id="rId17"/>
+      <p:regular r:id="rId18"/>
     </p:embeddedFont>
     <p:embeddedFont>
       <p:font typeface="Public Sans Thin Bold" panose="020B0604020202020204" charset="0"/>
-      <p:regular r:id="rId18"/>
+      <p:regular r:id="rId19"/>
     </p:embeddedFont>
   </p:embeddedFontLst>
   <p:defaultTextStyle>
@@ -237,7 +238,7 @@
           <a:p>
             <a:fld id="{86F0EAD1-3381-4BA3-8B82-B34ECA40E49A}" type="datetimeFigureOut">
               <a:rPr lang="pt-BR" smtClean="0"/>
-              <a:t>23/08/2022</a:t>
+              <a:t>24/08/2022</a:t>
             </a:fld>
             <a:endParaRPr lang="pt-BR"/>
           </a:p>
@@ -548,221 +549,6 @@
           <a:bodyPr/>
           <a:lstStyle/>
           <a:p>
-            <a:pPr marL="0" marR="0" lvl="0" indent="0" algn="l" defTabSz="914400" rtl="0" eaLnBrk="1" fontAlgn="auto" latinLnBrk="0" hangingPunct="1">
-              <a:lnSpc>
-                <a:spcPct val="100000"/>
-              </a:lnSpc>
-              <a:spcBef>
-                <a:spcPts val="0"/>
-              </a:spcBef>
-              <a:spcAft>
-                <a:spcPts val="0"/>
-              </a:spcAft>
-              <a:buClrTx/>
-              <a:buSzTx/>
-              <a:buFontTx/>
-              <a:buNone/>
-              <a:tabLst/>
-              <a:defRPr/>
-            </a:pPr>
-            <a:r>
-              <a:rPr lang="pt-BR" dirty="0"/>
-              <a:t>Bom dia a todos! </a:t>
-            </a:r>
-          </a:p>
-          <a:p>
-            <a:pPr marL="0" marR="0" lvl="0" indent="0" algn="l" defTabSz="914400" rtl="0" eaLnBrk="1" fontAlgn="auto" latinLnBrk="0" hangingPunct="1">
-              <a:lnSpc>
-                <a:spcPct val="100000"/>
-              </a:lnSpc>
-              <a:spcBef>
-                <a:spcPts val="0"/>
-              </a:spcBef>
-              <a:spcAft>
-                <a:spcPts val="0"/>
-              </a:spcAft>
-              <a:buClrTx/>
-              <a:buSzTx/>
-              <a:buFontTx/>
-              <a:buNone/>
-              <a:tabLst/>
-              <a:defRPr/>
-            </a:pPr>
-            <a:endParaRPr lang="pt-BR" dirty="0"/>
-          </a:p>
-          <a:p>
-            <a:pPr marL="0" marR="0" lvl="0" indent="0" algn="l" defTabSz="914400" rtl="0" eaLnBrk="1" fontAlgn="auto" latinLnBrk="0" hangingPunct="1">
-              <a:lnSpc>
-                <a:spcPct val="100000"/>
-              </a:lnSpc>
-              <a:spcBef>
-                <a:spcPts val="0"/>
-              </a:spcBef>
-              <a:spcAft>
-                <a:spcPts val="0"/>
-              </a:spcAft>
-              <a:buClrTx/>
-              <a:buSzTx/>
-              <a:buFontTx/>
-              <a:buNone/>
-              <a:tabLst/>
-              <a:defRPr/>
-            </a:pPr>
-            <a:r>
-              <a:rPr lang="pt-BR" dirty="0"/>
-              <a:t>Gostaria de agradecer aos Prof. Guido Lemos, Prof. Paulo DiTarso e Prof. Rostand Costa por aceitarem o convite em participar desta banca e pela disponibilidade em avaliar o meu trabalho.</a:t>
-            </a:r>
-          </a:p>
-          <a:p>
-            <a:pPr marL="0" marR="0" lvl="0" indent="0" algn="l" defTabSz="914400" rtl="0" eaLnBrk="1" fontAlgn="auto" latinLnBrk="0" hangingPunct="1">
-              <a:lnSpc>
-                <a:spcPct val="100000"/>
-              </a:lnSpc>
-              <a:spcBef>
-                <a:spcPts val="0"/>
-              </a:spcBef>
-              <a:spcAft>
-                <a:spcPts val="0"/>
-              </a:spcAft>
-              <a:buClrTx/>
-              <a:buSzTx/>
-              <a:buFontTx/>
-              <a:buNone/>
-              <a:tabLst/>
-              <a:defRPr/>
-            </a:pPr>
-            <a:endParaRPr lang="pt-BR" dirty="0"/>
-          </a:p>
-          <a:p>
-            <a:pPr marL="0" marR="0" lvl="0" indent="0" algn="l" defTabSz="914400" rtl="0" eaLnBrk="1" fontAlgn="auto" latinLnBrk="0" hangingPunct="1">
-              <a:lnSpc>
-                <a:spcPct val="100000"/>
-              </a:lnSpc>
-              <a:spcBef>
-                <a:spcPts val="0"/>
-              </a:spcBef>
-              <a:spcAft>
-                <a:spcPts val="0"/>
-              </a:spcAft>
-              <a:buClrTx/>
-              <a:buSzTx/>
-              <a:buFontTx/>
-              <a:buNone/>
-              <a:tabLst/>
-              <a:defRPr/>
-            </a:pPr>
-            <a:r>
-              <a:rPr lang="pt-BR" dirty="0"/>
-              <a:t>Agradeço ao meu orientador Prof. Dênio Mariz e ao meu co-orientador Prof. Rostand Costa pela orientação. </a:t>
-            </a:r>
-          </a:p>
-          <a:p>
-            <a:pPr marL="0" marR="0" lvl="0" indent="0" algn="l" defTabSz="914400" rtl="0" eaLnBrk="1" fontAlgn="auto" latinLnBrk="0" hangingPunct="1">
-              <a:lnSpc>
-                <a:spcPct val="100000"/>
-              </a:lnSpc>
-              <a:spcBef>
-                <a:spcPts val="0"/>
-              </a:spcBef>
-              <a:spcAft>
-                <a:spcPts val="0"/>
-              </a:spcAft>
-              <a:buClrTx/>
-              <a:buSzTx/>
-              <a:buFontTx/>
-              <a:buNone/>
-              <a:tabLst/>
-              <a:defRPr/>
-            </a:pPr>
-            <a:endParaRPr lang="pt-BR" dirty="0"/>
-          </a:p>
-          <a:p>
-            <a:pPr marL="0" marR="0" lvl="0" indent="0" algn="l" defTabSz="914400" rtl="0" eaLnBrk="1" fontAlgn="auto" latinLnBrk="0" hangingPunct="1">
-              <a:lnSpc>
-                <a:spcPct val="100000"/>
-              </a:lnSpc>
-              <a:spcBef>
-                <a:spcPts val="0"/>
-              </a:spcBef>
-              <a:spcAft>
-                <a:spcPts val="0"/>
-              </a:spcAft>
-              <a:buClrTx/>
-              <a:buSzTx/>
-              <a:buFontTx/>
-              <a:buNone/>
-              <a:tabLst/>
-              <a:defRPr/>
-            </a:pPr>
-            <a:r>
-              <a:rPr lang="pt-BR" dirty="0"/>
-              <a:t>Agradeço aos demais presentes por prestigiar a minha defesa.</a:t>
-            </a:r>
-          </a:p>
-          <a:p>
-            <a:pPr marL="0" marR="0" lvl="0" indent="0" algn="l" defTabSz="914400" rtl="0" eaLnBrk="1" fontAlgn="auto" latinLnBrk="0" hangingPunct="1">
-              <a:lnSpc>
-                <a:spcPct val="100000"/>
-              </a:lnSpc>
-              <a:spcBef>
-                <a:spcPts val="0"/>
-              </a:spcBef>
-              <a:spcAft>
-                <a:spcPts val="0"/>
-              </a:spcAft>
-              <a:buClrTx/>
-              <a:buSzTx/>
-              <a:buFontTx/>
-              <a:buNone/>
-              <a:tabLst/>
-              <a:defRPr/>
-            </a:pPr>
-            <a:endParaRPr lang="pt-BR" dirty="0"/>
-          </a:p>
-          <a:p>
-            <a:pPr marL="0" marR="0" lvl="0" indent="0" algn="l" defTabSz="914400" rtl="0" eaLnBrk="1" fontAlgn="auto" latinLnBrk="0" hangingPunct="1">
-              <a:lnSpc>
-                <a:spcPct val="100000"/>
-              </a:lnSpc>
-              <a:spcBef>
-                <a:spcPts val="0"/>
-              </a:spcBef>
-              <a:spcAft>
-                <a:spcPts val="0"/>
-              </a:spcAft>
-              <a:buClrTx/>
-              <a:buSzTx/>
-              <a:buFontTx/>
-              <a:buNone/>
-              <a:tabLst/>
-              <a:defRPr/>
-            </a:pPr>
-            <a:endParaRPr lang="pt-BR" dirty="0"/>
-          </a:p>
-          <a:p>
-            <a:pPr marL="0" marR="0" lvl="0" indent="0" algn="l" defTabSz="914400" rtl="0" eaLnBrk="1" fontAlgn="auto" latinLnBrk="0" hangingPunct="1">
-              <a:lnSpc>
-                <a:spcPct val="100000"/>
-              </a:lnSpc>
-              <a:spcBef>
-                <a:spcPts val="0"/>
-              </a:spcBef>
-              <a:spcAft>
-                <a:spcPts val="0"/>
-              </a:spcAft>
-              <a:buClrTx/>
-              <a:buSzTx/>
-              <a:buFontTx/>
-              <a:buNone/>
-              <a:tabLst/>
-              <a:defRPr/>
-            </a:pPr>
-            <a:r>
-              <a:rPr lang="pt-BR" b="1" dirty="0"/>
-              <a:t>O título do meu trabalho é PrivacyChain: Um framework para ...</a:t>
-            </a:r>
-          </a:p>
-          <a:p>
             <a:endParaRPr lang="pt-BR" dirty="0"/>
           </a:p>
         </p:txBody>
@@ -794,6 +580,90 @@
     <p:extLst>
       <p:ext uri="{BB962C8B-B14F-4D97-AF65-F5344CB8AC3E}">
         <p14:creationId xmlns:p14="http://schemas.microsoft.com/office/powerpoint/2010/main" val="1322672789"/>
+      </p:ext>
+    </p:extLst>
+  </p:cSld>
+  <p:clrMapOvr>
+    <a:masterClrMapping/>
+  </p:clrMapOvr>
+</p:notes>
+</file>
+
+<file path=ppt/notesSlides/notesSlide10.xml><?xml version="1.0" encoding="utf-8"?>
+<p:notes xmlns:a="http://schemas.openxmlformats.org/drawingml/2006/main" xmlns:r="http://schemas.openxmlformats.org/officeDocument/2006/relationships" xmlns:p="http://schemas.openxmlformats.org/presentationml/2006/main">
+  <p:cSld>
+    <p:spTree>
+      <p:nvGrpSpPr>
+        <p:cNvPr id="1" name=""/>
+        <p:cNvGrpSpPr/>
+        <p:nvPr/>
+      </p:nvGrpSpPr>
+      <p:grpSpPr>
+        <a:xfrm>
+          <a:off x="0" y="0"/>
+          <a:ext cx="0" cy="0"/>
+          <a:chOff x="0" y="0"/>
+          <a:chExt cx="0" cy="0"/>
+        </a:xfrm>
+      </p:grpSpPr>
+      <p:sp>
+        <p:nvSpPr>
+          <p:cNvPr id="2" name="Espaço Reservado para Imagem de Slide 1"/>
+          <p:cNvSpPr>
+            <a:spLocks noGrp="1" noRot="1" noChangeAspect="1"/>
+          </p:cNvSpPr>
+          <p:nvPr>
+            <p:ph type="sldImg"/>
+          </p:nvPr>
+        </p:nvSpPr>
+        <p:spPr/>
+      </p:sp>
+      <p:sp>
+        <p:nvSpPr>
+          <p:cNvPr id="3" name="Espaço Reservado para Anotações 2"/>
+          <p:cNvSpPr>
+            <a:spLocks noGrp="1"/>
+          </p:cNvSpPr>
+          <p:nvPr>
+            <p:ph type="body" idx="1"/>
+          </p:nvPr>
+        </p:nvSpPr>
+        <p:spPr/>
+        <p:txBody>
+          <a:bodyPr/>
+          <a:lstStyle/>
+          <a:p>
+            <a:endParaRPr lang="pt-BR" dirty="0"/>
+          </a:p>
+        </p:txBody>
+      </p:sp>
+      <p:sp>
+        <p:nvSpPr>
+          <p:cNvPr id="4" name="Espaço Reservado para Número de Slide 3"/>
+          <p:cNvSpPr>
+            <a:spLocks noGrp="1"/>
+          </p:cNvSpPr>
+          <p:nvPr>
+            <p:ph type="sldNum" sz="quarter" idx="5"/>
+          </p:nvPr>
+        </p:nvSpPr>
+        <p:spPr/>
+        <p:txBody>
+          <a:bodyPr/>
+          <a:lstStyle/>
+          <a:p>
+            <a:fld id="{2E6EB1E6-5135-49A2-BB67-47B8D46CE96A}" type="slidenum">
+              <a:rPr lang="pt-BR" smtClean="0"/>
+              <a:t>10</a:t>
+            </a:fld>
+            <a:endParaRPr lang="pt-BR"/>
+          </a:p>
+        </p:txBody>
+      </p:sp>
+    </p:spTree>
+    <p:extLst>
+      <p:ext uri="{BB962C8B-B14F-4D97-AF65-F5344CB8AC3E}">
+        <p14:creationId xmlns:p14="http://schemas.microsoft.com/office/powerpoint/2010/main" val="2253313885"/>
       </p:ext>
     </p:extLst>
   </p:cSld>
@@ -847,16 +717,7 @@
           <a:bodyPr/>
           <a:lstStyle/>
           <a:p>
-            <a:r>
-              <a:rPr lang="pt-BR" dirty="0"/>
-              <a:t>Primeiramente uma breve contextualização sobre o tema, apresentando alguns conceitos que servem de base para a apresentação da solução.</a:t>
-            </a:r>
-          </a:p>
-          <a:p>
-            <a:r>
-              <a:rPr lang="pt-BR" dirty="0"/>
-              <a:t>Fonte: ANPD</a:t>
-            </a:r>
+            <a:endParaRPr lang="pt-BR" dirty="0"/>
           </a:p>
         </p:txBody>
       </p:sp>
@@ -940,16 +801,7 @@
           <a:bodyPr/>
           <a:lstStyle/>
           <a:p>
-            <a:r>
-              <a:rPr lang="pt-BR" dirty="0"/>
-              <a:t>Primeiramente uma breve contextualização sobre o tema, apresentando alguns conceitos que servem de base para a apresentação da solução.</a:t>
-            </a:r>
-          </a:p>
-          <a:p>
-            <a:r>
-              <a:rPr lang="pt-BR" dirty="0"/>
-              <a:t>Fonte: ANPD</a:t>
-            </a:r>
+            <a:endParaRPr lang="pt-BR" dirty="0"/>
           </a:p>
         </p:txBody>
       </p:sp>
@@ -1033,16 +885,7 @@
           <a:bodyPr/>
           <a:lstStyle/>
           <a:p>
-            <a:r>
-              <a:rPr lang="pt-BR" dirty="0"/>
-              <a:t>Primeiramente uma breve contextualização sobre o tema, apresentando alguns conceitos que servem de base para a apresentação da solução.</a:t>
-            </a:r>
-          </a:p>
-          <a:p>
-            <a:r>
-              <a:rPr lang="pt-BR" dirty="0"/>
-              <a:t>Fonte: ANPD</a:t>
-            </a:r>
+            <a:endParaRPr lang="pt-BR" dirty="0"/>
           </a:p>
         </p:txBody>
       </p:sp>
@@ -1126,34 +969,11 @@
           <a:bodyPr/>
           <a:lstStyle/>
           <a:p>
-            <a:r>
-              <a:rPr lang="pt-BR" dirty="0">
-                <a:solidFill>
-                  <a:srgbClr val="FF0000"/>
-                </a:solidFill>
-              </a:rPr>
-              <a:t>Essa figura sintetiza a estrutura da metodologia utilizada nesse trabalho.</a:t>
-            </a:r>
-          </a:p>
-          <a:p>
-            <a:r>
-              <a:rPr lang="pt-BR" dirty="0">
-                <a:solidFill>
-                  <a:srgbClr val="FF0000"/>
-                </a:solidFill>
-              </a:rPr>
-              <a:t>Metodologia baseada na Design Science Research e cujos detalhes estão no corpo da dissertação.</a:t>
-            </a:r>
-          </a:p>
-          <a:p>
-            <a:r>
-              <a:rPr lang="pt-BR" dirty="0">
-                <a:solidFill>
-                  <a:srgbClr val="FF0000"/>
-                </a:solidFill>
-              </a:rPr>
-              <a:t>&lt;&lt;Não comentar a figura!!&gt;&gt;</a:t>
-            </a:r>
+            <a:endParaRPr lang="pt-BR" dirty="0">
+              <a:solidFill>
+                <a:srgbClr val="FF0000"/>
+              </a:solidFill>
+            </a:endParaRPr>
           </a:p>
         </p:txBody>
       </p:sp>
@@ -1237,34 +1057,11 @@
           <a:bodyPr/>
           <a:lstStyle/>
           <a:p>
-            <a:r>
-              <a:rPr lang="pt-BR" dirty="0">
-                <a:solidFill>
-                  <a:srgbClr val="FF0000"/>
-                </a:solidFill>
-              </a:rPr>
-              <a:t>Essa figura sintetiza a estrutura da metodologia utilizada nesse trabalho.</a:t>
-            </a:r>
-          </a:p>
-          <a:p>
-            <a:r>
-              <a:rPr lang="pt-BR" dirty="0">
-                <a:solidFill>
-                  <a:srgbClr val="FF0000"/>
-                </a:solidFill>
-              </a:rPr>
-              <a:t>Metodologia baseada na Design Science Research e cujos detalhes estão no corpo da dissertação.</a:t>
-            </a:r>
-          </a:p>
-          <a:p>
-            <a:r>
-              <a:rPr lang="pt-BR" dirty="0">
-                <a:solidFill>
-                  <a:srgbClr val="FF0000"/>
-                </a:solidFill>
-              </a:rPr>
-              <a:t>&lt;&lt;Não comentar a figura!!&gt;&gt;</a:t>
-            </a:r>
+            <a:endParaRPr lang="pt-BR" dirty="0">
+              <a:solidFill>
+                <a:srgbClr val="FF0000"/>
+              </a:solidFill>
+            </a:endParaRPr>
           </a:p>
         </p:txBody>
       </p:sp>
@@ -1348,34 +1145,11 @@
           <a:bodyPr/>
           <a:lstStyle/>
           <a:p>
-            <a:r>
-              <a:rPr lang="pt-BR" dirty="0">
-                <a:solidFill>
-                  <a:srgbClr val="FF0000"/>
-                </a:solidFill>
-              </a:rPr>
-              <a:t>Essa figura sintetiza a estrutura da metodologia utilizada nesse trabalho.</a:t>
-            </a:r>
-          </a:p>
-          <a:p>
-            <a:r>
-              <a:rPr lang="pt-BR" dirty="0">
-                <a:solidFill>
-                  <a:srgbClr val="FF0000"/>
-                </a:solidFill>
-              </a:rPr>
-              <a:t>Metodologia baseada na Design Science Research e cujos detalhes estão no corpo da dissertação.</a:t>
-            </a:r>
-          </a:p>
-          <a:p>
-            <a:r>
-              <a:rPr lang="pt-BR" dirty="0">
-                <a:solidFill>
-                  <a:srgbClr val="FF0000"/>
-                </a:solidFill>
-              </a:rPr>
-              <a:t>&lt;&lt;Não comentar a figura!!&gt;&gt;</a:t>
-            </a:r>
+            <a:endParaRPr lang="pt-BR" dirty="0">
+              <a:solidFill>
+                <a:srgbClr val="FF0000"/>
+              </a:solidFill>
+            </a:endParaRPr>
           </a:p>
         </p:txBody>
       </p:sp>
@@ -1459,34 +1233,11 @@
           <a:bodyPr/>
           <a:lstStyle/>
           <a:p>
-            <a:r>
-              <a:rPr lang="pt-BR" dirty="0">
-                <a:solidFill>
-                  <a:srgbClr val="FF0000"/>
-                </a:solidFill>
-              </a:rPr>
-              <a:t>Essa figura sintetiza a estrutura da metodologia utilizada nesse trabalho.</a:t>
-            </a:r>
-          </a:p>
-          <a:p>
-            <a:r>
-              <a:rPr lang="pt-BR" dirty="0">
-                <a:solidFill>
-                  <a:srgbClr val="FF0000"/>
-                </a:solidFill>
-              </a:rPr>
-              <a:t>Metodologia baseada na Design Science Research e cujos detalhes estão no corpo da dissertação.</a:t>
-            </a:r>
-          </a:p>
-          <a:p>
-            <a:r>
-              <a:rPr lang="pt-BR" dirty="0">
-                <a:solidFill>
-                  <a:srgbClr val="FF0000"/>
-                </a:solidFill>
-              </a:rPr>
-              <a:t>&lt;&lt;Não comentar a figura!!&gt;&gt;</a:t>
-            </a:r>
+            <a:endParaRPr lang="pt-BR" dirty="0">
+              <a:solidFill>
+                <a:srgbClr val="FF0000"/>
+              </a:solidFill>
+            </a:endParaRPr>
           </a:p>
         </p:txBody>
       </p:sp>
@@ -1570,7 +1321,11 @@
           <a:bodyPr/>
           <a:lstStyle/>
           <a:p>
-            <a:endParaRPr lang="pt-BR" dirty="0"/>
+            <a:endParaRPr lang="pt-BR" dirty="0">
+              <a:solidFill>
+                <a:srgbClr val="FF0000"/>
+              </a:solidFill>
+            </a:endParaRPr>
           </a:p>
         </p:txBody>
       </p:sp>
@@ -1600,7 +1355,7 @@
     </p:spTree>
     <p:extLst>
       <p:ext uri="{BB962C8B-B14F-4D97-AF65-F5344CB8AC3E}">
-        <p14:creationId xmlns:p14="http://schemas.microsoft.com/office/powerpoint/2010/main" val="2253313885"/>
+        <p14:creationId xmlns:p14="http://schemas.microsoft.com/office/powerpoint/2010/main" val="205760752"/>
       </p:ext>
     </p:extLst>
   </p:cSld>
@@ -4900,6 +4655,544 @@
 </p:sld>
 </file>
 
+<file path=ppt/slides/slide10.xml><?xml version="1.0" encoding="utf-8"?>
+<p:sld xmlns:a="http://schemas.openxmlformats.org/drawingml/2006/main" xmlns:r="http://schemas.openxmlformats.org/officeDocument/2006/relationships" xmlns:p="http://schemas.openxmlformats.org/presentationml/2006/main">
+  <p:cSld>
+    <p:spTree>
+      <p:nvGrpSpPr>
+        <p:cNvPr id="1" name=""/>
+        <p:cNvGrpSpPr/>
+        <p:nvPr/>
+      </p:nvGrpSpPr>
+      <p:grpSpPr>
+        <a:xfrm>
+          <a:off x="0" y="0"/>
+          <a:ext cx="0" cy="0"/>
+          <a:chOff x="0" y="0"/>
+          <a:chExt cx="0" cy="0"/>
+        </a:xfrm>
+      </p:grpSpPr>
+      <p:sp>
+        <p:nvSpPr>
+          <p:cNvPr id="11" name="CaixaDeTexto 10">
+            <a:extLst>
+              <a:ext uri="{FF2B5EF4-FFF2-40B4-BE49-F238E27FC236}">
+                <a16:creationId xmlns:a16="http://schemas.microsoft.com/office/drawing/2014/main" id="{DD026802-6EB7-438B-AA9E-1926C71A2933}"/>
+              </a:ext>
+            </a:extLst>
+          </p:cNvPr>
+          <p:cNvSpPr txBox="1"/>
+          <p:nvPr/>
+        </p:nvSpPr>
+        <p:spPr>
+          <a:xfrm>
+            <a:off x="4422572" y="4572000"/>
+            <a:ext cx="9442856" cy="1142999"/>
+          </a:xfrm>
+          <a:prstGeom prst="rect">
+            <a:avLst/>
+          </a:prstGeom>
+          <a:noFill/>
+        </p:spPr>
+        <p:txBody>
+          <a:bodyPr wrap="square" rtlCol="0">
+            <a:noAutofit/>
+          </a:bodyPr>
+          <a:lstStyle/>
+          <a:p>
+            <a:pPr algn="ctr"/>
+            <a:r>
+              <a:rPr lang="pt-BR" sz="7000" b="1" dirty="0">
+                <a:solidFill>
+                  <a:srgbClr val="273C54"/>
+                </a:solidFill>
+                <a:latin typeface="Public Sans" panose="020B0604020202020204" charset="0"/>
+              </a:rPr>
+              <a:t>Perguntas?</a:t>
+            </a:r>
+          </a:p>
+        </p:txBody>
+      </p:sp>
+      <p:cxnSp>
+        <p:nvCxnSpPr>
+          <p:cNvPr id="13" name="Conector reto 12">
+            <a:extLst>
+              <a:ext uri="{FF2B5EF4-FFF2-40B4-BE49-F238E27FC236}">
+                <a16:creationId xmlns:a16="http://schemas.microsoft.com/office/drawing/2014/main" id="{1B07FFEF-6D31-4504-9045-492C98434C8A}"/>
+              </a:ext>
+            </a:extLst>
+          </p:cNvPr>
+          <p:cNvCxnSpPr>
+            <a:cxnSpLocks/>
+          </p:cNvCxnSpPr>
+          <p:nvPr/>
+        </p:nvCxnSpPr>
+        <p:spPr>
+          <a:xfrm>
+            <a:off x="685800" y="1620994"/>
+            <a:ext cx="14672916" cy="0"/>
+          </a:xfrm>
+          <a:prstGeom prst="line">
+            <a:avLst/>
+          </a:prstGeom>
+          <a:ln>
+            <a:solidFill>
+              <a:srgbClr val="3FA54E"/>
+            </a:solidFill>
+          </a:ln>
+        </p:spPr>
+        <p:style>
+          <a:lnRef idx="1">
+            <a:schemeClr val="accent1"/>
+          </a:lnRef>
+          <a:fillRef idx="0">
+            <a:schemeClr val="accent1"/>
+          </a:fillRef>
+          <a:effectRef idx="0">
+            <a:schemeClr val="accent1"/>
+          </a:effectRef>
+          <a:fontRef idx="minor">
+            <a:schemeClr val="tx1"/>
+          </a:fontRef>
+        </p:style>
+      </p:cxnSp>
+      <p:sp>
+        <p:nvSpPr>
+          <p:cNvPr id="6" name="Espaço Reservado para Texto 2">
+            <a:extLst>
+              <a:ext uri="{FF2B5EF4-FFF2-40B4-BE49-F238E27FC236}">
+                <a16:creationId xmlns:a16="http://schemas.microsoft.com/office/drawing/2014/main" id="{2BF9C160-BFF2-4A74-905D-3B8554E994AC}"/>
+              </a:ext>
+            </a:extLst>
+          </p:cNvPr>
+          <p:cNvSpPr txBox="1">
+            <a:spLocks/>
+          </p:cNvSpPr>
+          <p:nvPr/>
+        </p:nvSpPr>
+        <p:spPr>
+          <a:xfrm>
+            <a:off x="623400" y="7581900"/>
+            <a:ext cx="17136142" cy="2057399"/>
+          </a:xfrm>
+          <a:prstGeom prst="rect">
+            <a:avLst/>
+          </a:prstGeom>
+        </p:spPr>
+        <p:txBody>
+          <a:bodyPr/>
+          <a:lstStyle>
+            <a:lvl1pPr marL="342900" indent="-342900" algn="l" defTabSz="914400" rtl="0" eaLnBrk="1" latinLnBrk="0" hangingPunct="1">
+              <a:spcBef>
+                <a:spcPct val="20000"/>
+              </a:spcBef>
+              <a:buFont typeface="Arial" pitchFamily="34" charset="0"/>
+              <a:buChar char="•"/>
+              <a:defRPr sz="3200" kern="1200">
+                <a:solidFill>
+                  <a:schemeClr val="tx1"/>
+                </a:solidFill>
+                <a:latin typeface="+mn-lt"/>
+                <a:ea typeface="+mn-ea"/>
+                <a:cs typeface="+mn-cs"/>
+              </a:defRPr>
+            </a:lvl1pPr>
+            <a:lvl2pPr marL="742950" indent="-285750" algn="l" defTabSz="914400" rtl="0" eaLnBrk="1" latinLnBrk="0" hangingPunct="1">
+              <a:spcBef>
+                <a:spcPct val="20000"/>
+              </a:spcBef>
+              <a:buFont typeface="Arial" pitchFamily="34" charset="0"/>
+              <a:buChar char="–"/>
+              <a:defRPr sz="2800" kern="1200">
+                <a:solidFill>
+                  <a:schemeClr val="tx1"/>
+                </a:solidFill>
+                <a:latin typeface="+mn-lt"/>
+                <a:ea typeface="+mn-ea"/>
+                <a:cs typeface="+mn-cs"/>
+              </a:defRPr>
+            </a:lvl2pPr>
+            <a:lvl3pPr marL="1143000" indent="-228600" algn="l" defTabSz="914400" rtl="0" eaLnBrk="1" latinLnBrk="0" hangingPunct="1">
+              <a:spcBef>
+                <a:spcPct val="20000"/>
+              </a:spcBef>
+              <a:buFont typeface="Arial" pitchFamily="34" charset="0"/>
+              <a:buChar char="•"/>
+              <a:defRPr sz="2400" kern="1200">
+                <a:solidFill>
+                  <a:schemeClr val="tx1"/>
+                </a:solidFill>
+                <a:latin typeface="+mn-lt"/>
+                <a:ea typeface="+mn-ea"/>
+                <a:cs typeface="+mn-cs"/>
+              </a:defRPr>
+            </a:lvl3pPr>
+            <a:lvl4pPr marL="1600200" indent="-228600" algn="l" defTabSz="914400" rtl="0" eaLnBrk="1" latinLnBrk="0" hangingPunct="1">
+              <a:spcBef>
+                <a:spcPct val="20000"/>
+              </a:spcBef>
+              <a:buFont typeface="Arial" pitchFamily="34" charset="0"/>
+              <a:buChar char="–"/>
+              <a:defRPr sz="2000" kern="1200">
+                <a:solidFill>
+                  <a:schemeClr val="tx1"/>
+                </a:solidFill>
+                <a:latin typeface="+mn-lt"/>
+                <a:ea typeface="+mn-ea"/>
+                <a:cs typeface="+mn-cs"/>
+              </a:defRPr>
+            </a:lvl4pPr>
+            <a:lvl5pPr marL="2057400" indent="-228600" algn="l" defTabSz="914400" rtl="0" eaLnBrk="1" latinLnBrk="0" hangingPunct="1">
+              <a:spcBef>
+                <a:spcPct val="20000"/>
+              </a:spcBef>
+              <a:buFont typeface="Arial" pitchFamily="34" charset="0"/>
+              <a:buChar char="»"/>
+              <a:defRPr sz="2000" kern="1200">
+                <a:solidFill>
+                  <a:schemeClr val="tx1"/>
+                </a:solidFill>
+                <a:latin typeface="+mn-lt"/>
+                <a:ea typeface="+mn-ea"/>
+                <a:cs typeface="+mn-cs"/>
+              </a:defRPr>
+            </a:lvl5pPr>
+            <a:lvl6pPr marL="2514600" indent="-228600" algn="l" defTabSz="914400" rtl="0" eaLnBrk="1" latinLnBrk="0" hangingPunct="1">
+              <a:spcBef>
+                <a:spcPct val="20000"/>
+              </a:spcBef>
+              <a:buFont typeface="Arial" pitchFamily="34" charset="0"/>
+              <a:buChar char="•"/>
+              <a:defRPr sz="2000" kern="1200">
+                <a:solidFill>
+                  <a:schemeClr val="tx1"/>
+                </a:solidFill>
+                <a:latin typeface="+mn-lt"/>
+                <a:ea typeface="+mn-ea"/>
+                <a:cs typeface="+mn-cs"/>
+              </a:defRPr>
+            </a:lvl6pPr>
+            <a:lvl7pPr marL="2971800" indent="-228600" algn="l" defTabSz="914400" rtl="0" eaLnBrk="1" latinLnBrk="0" hangingPunct="1">
+              <a:spcBef>
+                <a:spcPct val="20000"/>
+              </a:spcBef>
+              <a:buFont typeface="Arial" pitchFamily="34" charset="0"/>
+              <a:buChar char="•"/>
+              <a:defRPr sz="2000" kern="1200">
+                <a:solidFill>
+                  <a:schemeClr val="tx1"/>
+                </a:solidFill>
+                <a:latin typeface="+mn-lt"/>
+                <a:ea typeface="+mn-ea"/>
+                <a:cs typeface="+mn-cs"/>
+              </a:defRPr>
+            </a:lvl7pPr>
+            <a:lvl8pPr marL="3429000" indent="-228600" algn="l" defTabSz="914400" rtl="0" eaLnBrk="1" latinLnBrk="0" hangingPunct="1">
+              <a:spcBef>
+                <a:spcPct val="20000"/>
+              </a:spcBef>
+              <a:buFont typeface="Arial" pitchFamily="34" charset="0"/>
+              <a:buChar char="•"/>
+              <a:defRPr sz="2000" kern="1200">
+                <a:solidFill>
+                  <a:schemeClr val="tx1"/>
+                </a:solidFill>
+                <a:latin typeface="+mn-lt"/>
+                <a:ea typeface="+mn-ea"/>
+                <a:cs typeface="+mn-cs"/>
+              </a:defRPr>
+            </a:lvl8pPr>
+            <a:lvl9pPr marL="3886200" indent="-228600" algn="l" defTabSz="914400" rtl="0" eaLnBrk="1" latinLnBrk="0" hangingPunct="1">
+              <a:spcBef>
+                <a:spcPct val="20000"/>
+              </a:spcBef>
+              <a:buFont typeface="Arial" pitchFamily="34" charset="0"/>
+              <a:buChar char="•"/>
+              <a:defRPr sz="2000" kern="1200">
+                <a:solidFill>
+                  <a:schemeClr val="tx1"/>
+                </a:solidFill>
+                <a:latin typeface="+mn-lt"/>
+                <a:ea typeface="+mn-ea"/>
+                <a:cs typeface="+mn-cs"/>
+              </a:defRPr>
+            </a:lvl9pPr>
+          </a:lstStyle>
+          <a:p>
+            <a:pPr marL="114300" indent="0">
+              <a:buFont typeface="Arial" pitchFamily="34" charset="0"/>
+              <a:buNone/>
+            </a:pPr>
+            <a:r>
+              <a:rPr lang="pt-BR" b="1" dirty="0">
+                <a:solidFill>
+                  <a:srgbClr val="273C54"/>
+                </a:solidFill>
+                <a:latin typeface="Public Sans" panose="020B0604020202020204" charset="0"/>
+              </a:rPr>
+              <a:t>Contatos:</a:t>
+            </a:r>
+          </a:p>
+          <a:p>
+            <a:pPr marL="114300" indent="0">
+              <a:buFont typeface="Arial" pitchFamily="34" charset="0"/>
+              <a:buNone/>
+            </a:pPr>
+            <a:r>
+              <a:rPr lang="pt-BR" b="1" dirty="0">
+                <a:solidFill>
+                  <a:srgbClr val="273C54"/>
+                </a:solidFill>
+                <a:latin typeface="Public Sans" panose="020B0604020202020204" charset="0"/>
+              </a:rPr>
+              <a:t>Anderson Boa Morte</a:t>
+            </a:r>
+            <a:endParaRPr lang="pt-BR" b="1" dirty="0">
+              <a:solidFill>
+                <a:srgbClr val="273C54"/>
+              </a:solidFill>
+              <a:latin typeface="Public Sans" panose="020B0604020202020204" charset="0"/>
+              <a:hlinkClick r:id="rId3">
+                <a:extLst>
+                  <a:ext uri="{A12FA001-AC4F-418D-AE19-62706E023703}">
+                    <ahyp:hlinkClr xmlns:ahyp="http://schemas.microsoft.com/office/drawing/2018/hyperlinkcolor" val="tx"/>
+                  </a:ext>
+                </a:extLst>
+              </a:hlinkClick>
+            </a:endParaRPr>
+          </a:p>
+          <a:p>
+            <a:pPr marL="114300" indent="0">
+              <a:buFont typeface="Arial" pitchFamily="34" charset="0"/>
+              <a:buNone/>
+            </a:pPr>
+            <a:r>
+              <a:rPr lang="pt-BR" b="1" dirty="0">
+                <a:hlinkClick r:id="rId3"/>
+              </a:rPr>
+              <a:t>andersonmorte@ufba.br</a:t>
+            </a:r>
+            <a:endParaRPr lang="pt-BR" b="1" dirty="0"/>
+          </a:p>
+          <a:p>
+            <a:endParaRPr lang="pt-BR" dirty="0"/>
+          </a:p>
+          <a:p>
+            <a:endParaRPr lang="pt-BR" dirty="0"/>
+          </a:p>
+          <a:p>
+            <a:endParaRPr lang="pt-BR" dirty="0"/>
+          </a:p>
+          <a:p>
+            <a:endParaRPr lang="pt-BR" dirty="0"/>
+          </a:p>
+        </p:txBody>
+      </p:sp>
+      <p:pic>
+        <p:nvPicPr>
+          <p:cNvPr id="7" name="Imagem 6">
+            <a:extLst>
+              <a:ext uri="{FF2B5EF4-FFF2-40B4-BE49-F238E27FC236}">
+                <a16:creationId xmlns:a16="http://schemas.microsoft.com/office/drawing/2014/main" id="{A70207E5-DAA3-4C90-BD5B-4BBA8B7B7214}"/>
+              </a:ext>
+            </a:extLst>
+          </p:cNvPr>
+          <p:cNvPicPr>
+            <a:picLocks noChangeAspect="1"/>
+          </p:cNvPicPr>
+          <p:nvPr/>
+        </p:nvPicPr>
+        <p:blipFill>
+          <a:blip r:embed="rId4"/>
+          <a:stretch>
+            <a:fillRect/>
+          </a:stretch>
+        </p:blipFill>
+        <p:spPr>
+          <a:xfrm>
+            <a:off x="16306800" y="7581900"/>
+            <a:ext cx="381600" cy="416933"/>
+          </a:xfrm>
+          <a:prstGeom prst="rect">
+            <a:avLst/>
+          </a:prstGeom>
+        </p:spPr>
+      </p:pic>
+      <p:pic>
+        <p:nvPicPr>
+          <p:cNvPr id="8" name="Imagem 7">
+            <a:extLst>
+              <a:ext uri="{FF2B5EF4-FFF2-40B4-BE49-F238E27FC236}">
+                <a16:creationId xmlns:a16="http://schemas.microsoft.com/office/drawing/2014/main" id="{D0FE850A-EBD5-4D38-A190-C0FC70D66500}"/>
+              </a:ext>
+            </a:extLst>
+          </p:cNvPr>
+          <p:cNvPicPr>
+            <a:picLocks noChangeAspect="1"/>
+          </p:cNvPicPr>
+          <p:nvPr/>
+        </p:nvPicPr>
+        <p:blipFill>
+          <a:blip r:embed="rId5"/>
+          <a:stretch>
+            <a:fillRect/>
+          </a:stretch>
+        </p:blipFill>
+        <p:spPr>
+          <a:xfrm>
+            <a:off x="16303171" y="8583771"/>
+            <a:ext cx="381000" cy="381000"/>
+          </a:xfrm>
+          <a:prstGeom prst="rect">
+            <a:avLst/>
+          </a:prstGeom>
+        </p:spPr>
+      </p:pic>
+      <p:pic>
+        <p:nvPicPr>
+          <p:cNvPr id="9" name="Imagem 8">
+            <a:extLst>
+              <a:ext uri="{FF2B5EF4-FFF2-40B4-BE49-F238E27FC236}">
+                <a16:creationId xmlns:a16="http://schemas.microsoft.com/office/drawing/2014/main" id="{A18D460A-10A8-41D1-B9F3-ECC47411B0C7}"/>
+              </a:ext>
+            </a:extLst>
+          </p:cNvPr>
+          <p:cNvPicPr>
+            <a:picLocks noChangeAspect="1"/>
+          </p:cNvPicPr>
+          <p:nvPr/>
+        </p:nvPicPr>
+        <p:blipFill>
+          <a:blip r:embed="rId6"/>
+          <a:stretch>
+            <a:fillRect/>
+          </a:stretch>
+        </p:blipFill>
+        <p:spPr>
+          <a:xfrm>
+            <a:off x="16306800" y="8088732"/>
+            <a:ext cx="409575" cy="400050"/>
+          </a:xfrm>
+          <a:prstGeom prst="rect">
+            <a:avLst/>
+          </a:prstGeom>
+        </p:spPr>
+      </p:pic>
+      <p:sp>
+        <p:nvSpPr>
+          <p:cNvPr id="4" name="Espaço Reservado para Número de Slide 3">
+            <a:extLst>
+              <a:ext uri="{FF2B5EF4-FFF2-40B4-BE49-F238E27FC236}">
+                <a16:creationId xmlns:a16="http://schemas.microsoft.com/office/drawing/2014/main" id="{9DC27B37-C95B-4003-AF85-A44745CA4C1E}"/>
+              </a:ext>
+            </a:extLst>
+          </p:cNvPr>
+          <p:cNvSpPr>
+            <a:spLocks noGrp="1"/>
+          </p:cNvSpPr>
+          <p:nvPr>
+            <p:ph type="sldNum" sz="quarter" idx="12"/>
+          </p:nvPr>
+        </p:nvSpPr>
+        <p:spPr/>
+        <p:txBody>
+          <a:bodyPr/>
+          <a:lstStyle/>
+          <a:p>
+            <a:fld id="{B6F15528-21DE-4FAA-801E-634DDDAF4B2B}" type="slidenum">
+              <a:rPr lang="en-US" smtClean="0"/>
+              <a:pPr/>
+              <a:t>10</a:t>
+            </a:fld>
+            <a:endParaRPr lang="en-US"/>
+          </a:p>
+        </p:txBody>
+      </p:sp>
+      <p:pic>
+        <p:nvPicPr>
+          <p:cNvPr id="12" name="Imagem 11" descr="Uma imagem contendo Logotipo&#10;&#10;Descrição gerada automaticamente">
+            <a:extLst>
+              <a:ext uri="{FF2B5EF4-FFF2-40B4-BE49-F238E27FC236}">
+                <a16:creationId xmlns:a16="http://schemas.microsoft.com/office/drawing/2014/main" id="{815A2B97-202A-36B3-8E17-8112F2C0075A}"/>
+              </a:ext>
+            </a:extLst>
+          </p:cNvPr>
+          <p:cNvPicPr>
+            <a:picLocks noChangeAspect="1"/>
+          </p:cNvPicPr>
+          <p:nvPr/>
+        </p:nvPicPr>
+        <p:blipFill>
+          <a:blip r:embed="rId7">
+            <a:extLst>
+              <a:ext uri="{28A0092B-C50C-407E-A947-70E740481C1C}">
+                <a14:useLocalDpi xmlns:a14="http://schemas.microsoft.com/office/drawing/2010/main" val="0"/>
+              </a:ext>
+            </a:extLst>
+          </a:blip>
+          <a:stretch>
+            <a:fillRect/>
+          </a:stretch>
+        </p:blipFill>
+        <p:spPr>
+          <a:xfrm>
+            <a:off x="16230600" y="542544"/>
+            <a:ext cx="1892430" cy="667512"/>
+          </a:xfrm>
+          <a:prstGeom prst="rect">
+            <a:avLst/>
+          </a:prstGeom>
+        </p:spPr>
+      </p:pic>
+      <p:pic>
+        <p:nvPicPr>
+          <p:cNvPr id="14" name="Imagem 13" descr="Uma imagem contendo comida&#10;&#10;Descrição gerada automaticamente">
+            <a:extLst>
+              <a:ext uri="{FF2B5EF4-FFF2-40B4-BE49-F238E27FC236}">
+                <a16:creationId xmlns:a16="http://schemas.microsoft.com/office/drawing/2014/main" id="{C8218462-DD50-5653-03F4-D378ED850A96}"/>
+              </a:ext>
+            </a:extLst>
+          </p:cNvPr>
+          <p:cNvPicPr>
+            <a:picLocks noChangeAspect="1"/>
+          </p:cNvPicPr>
+          <p:nvPr/>
+        </p:nvPicPr>
+        <p:blipFill>
+          <a:blip r:embed="rId8">
+            <a:extLst>
+              <a:ext uri="{28A0092B-C50C-407E-A947-70E740481C1C}">
+                <a14:useLocalDpi xmlns:a14="http://schemas.microsoft.com/office/drawing/2010/main" val="0"/>
+              </a:ext>
+            </a:extLst>
+          </a:blip>
+          <a:stretch>
+            <a:fillRect/>
+          </a:stretch>
+        </p:blipFill>
+        <p:spPr>
+          <a:xfrm>
+            <a:off x="15393885" y="428562"/>
+            <a:ext cx="676369" cy="895475"/>
+          </a:xfrm>
+          <a:prstGeom prst="rect">
+            <a:avLst/>
+          </a:prstGeom>
+        </p:spPr>
+      </p:pic>
+    </p:spTree>
+    <p:extLst>
+      <p:ext uri="{BB962C8B-B14F-4D97-AF65-F5344CB8AC3E}">
+        <p14:creationId xmlns:p14="http://schemas.microsoft.com/office/powerpoint/2010/main" val="755002959"/>
+      </p:ext>
+    </p:extLst>
+  </p:cSld>
+  <p:clrMapOvr>
+    <a:masterClrMapping/>
+  </p:clrMapOvr>
+</p:sld>
+</file>
+
 <file path=ppt/slides/slide2.xml><?xml version="1.0" encoding="utf-8"?>
 <p:sld xmlns:a="http://schemas.openxmlformats.org/drawingml/2006/main" xmlns:r="http://schemas.openxmlformats.org/officeDocument/2006/relationships" xmlns:p="http://schemas.openxmlformats.org/presentationml/2006/main">
   <p:cSld>
@@ -7811,8 +8104,8 @@
         </p:nvSpPr>
         <p:spPr>
           <a:xfrm>
-            <a:off x="4422572" y="4572000"/>
-            <a:ext cx="9442856" cy="1142999"/>
+            <a:off x="528458" y="342900"/>
+            <a:ext cx="14482942" cy="1142999"/>
           </a:xfrm>
           <a:prstGeom prst="rect">
             <a:avLst/>
@@ -7825,7 +8118,6 @@
           </a:bodyPr>
           <a:lstStyle/>
           <a:p>
-            <a:pPr algn="ctr"/>
             <a:r>
               <a:rPr lang="pt-BR" sz="7000" b="1" dirty="0">
                 <a:solidFill>
@@ -7833,7 +8125,7 @@
                 </a:solidFill>
                 <a:latin typeface="Public Sans" panose="020B0604020202020204" charset="0"/>
               </a:rPr>
-              <a:t>Perguntas?</a:t>
+              <a:t>Código-exemplo 5</a:t>
             </a:r>
           </a:p>
         </p:txBody>
@@ -7883,254 +8175,40 @@
       </p:cxnSp>
       <p:sp>
         <p:nvSpPr>
-          <p:cNvPr id="6" name="Espaço Reservado para Texto 2">
+          <p:cNvPr id="4" name="Espaço Reservado para Número de Slide 3">
             <a:extLst>
               <a:ext uri="{FF2B5EF4-FFF2-40B4-BE49-F238E27FC236}">
-                <a16:creationId xmlns:a16="http://schemas.microsoft.com/office/drawing/2014/main" id="{2BF9C160-BFF2-4A74-905D-3B8554E994AC}"/>
+                <a16:creationId xmlns:a16="http://schemas.microsoft.com/office/drawing/2014/main" id="{B696C4BF-E2B0-4BE6-8ED5-BD04A5808786}"/>
               </a:ext>
             </a:extLst>
           </p:cNvPr>
-          <p:cNvSpPr txBox="1">
-            <a:spLocks/>
-          </p:cNvSpPr>
-          <p:nvPr/>
-        </p:nvSpPr>
-        <p:spPr>
-          <a:xfrm>
-            <a:off x="623400" y="7581900"/>
-            <a:ext cx="17136142" cy="2057399"/>
-          </a:xfrm>
-          <a:prstGeom prst="rect">
-            <a:avLst/>
-          </a:prstGeom>
-        </p:spPr>
+          <p:cNvSpPr>
+            <a:spLocks noGrp="1"/>
+          </p:cNvSpPr>
+          <p:nvPr>
+            <p:ph type="sldNum" sz="quarter" idx="12"/>
+          </p:nvPr>
+        </p:nvSpPr>
+        <p:spPr/>
         <p:txBody>
           <a:bodyPr/>
-          <a:lstStyle>
-            <a:lvl1pPr marL="342900" indent="-342900" algn="l" defTabSz="914400" rtl="0" eaLnBrk="1" latinLnBrk="0" hangingPunct="1">
-              <a:spcBef>
-                <a:spcPct val="20000"/>
-              </a:spcBef>
-              <a:buFont typeface="Arial" pitchFamily="34" charset="0"/>
-              <a:buChar char="•"/>
-              <a:defRPr sz="3200" kern="1200">
-                <a:solidFill>
-                  <a:schemeClr val="tx1"/>
-                </a:solidFill>
-                <a:latin typeface="+mn-lt"/>
-                <a:ea typeface="+mn-ea"/>
-                <a:cs typeface="+mn-cs"/>
-              </a:defRPr>
-            </a:lvl1pPr>
-            <a:lvl2pPr marL="742950" indent="-285750" algn="l" defTabSz="914400" rtl="0" eaLnBrk="1" latinLnBrk="0" hangingPunct="1">
-              <a:spcBef>
-                <a:spcPct val="20000"/>
-              </a:spcBef>
-              <a:buFont typeface="Arial" pitchFamily="34" charset="0"/>
-              <a:buChar char="–"/>
-              <a:defRPr sz="2800" kern="1200">
-                <a:solidFill>
-                  <a:schemeClr val="tx1"/>
-                </a:solidFill>
-                <a:latin typeface="+mn-lt"/>
-                <a:ea typeface="+mn-ea"/>
-                <a:cs typeface="+mn-cs"/>
-              </a:defRPr>
-            </a:lvl2pPr>
-            <a:lvl3pPr marL="1143000" indent="-228600" algn="l" defTabSz="914400" rtl="0" eaLnBrk="1" latinLnBrk="0" hangingPunct="1">
-              <a:spcBef>
-                <a:spcPct val="20000"/>
-              </a:spcBef>
-              <a:buFont typeface="Arial" pitchFamily="34" charset="0"/>
-              <a:buChar char="•"/>
-              <a:defRPr sz="2400" kern="1200">
-                <a:solidFill>
-                  <a:schemeClr val="tx1"/>
-                </a:solidFill>
-                <a:latin typeface="+mn-lt"/>
-                <a:ea typeface="+mn-ea"/>
-                <a:cs typeface="+mn-cs"/>
-              </a:defRPr>
-            </a:lvl3pPr>
-            <a:lvl4pPr marL="1600200" indent="-228600" algn="l" defTabSz="914400" rtl="0" eaLnBrk="1" latinLnBrk="0" hangingPunct="1">
-              <a:spcBef>
-                <a:spcPct val="20000"/>
-              </a:spcBef>
-              <a:buFont typeface="Arial" pitchFamily="34" charset="0"/>
-              <a:buChar char="–"/>
-              <a:defRPr sz="2000" kern="1200">
-                <a:solidFill>
-                  <a:schemeClr val="tx1"/>
-                </a:solidFill>
-                <a:latin typeface="+mn-lt"/>
-                <a:ea typeface="+mn-ea"/>
-                <a:cs typeface="+mn-cs"/>
-              </a:defRPr>
-            </a:lvl4pPr>
-            <a:lvl5pPr marL="2057400" indent="-228600" algn="l" defTabSz="914400" rtl="0" eaLnBrk="1" latinLnBrk="0" hangingPunct="1">
-              <a:spcBef>
-                <a:spcPct val="20000"/>
-              </a:spcBef>
-              <a:buFont typeface="Arial" pitchFamily="34" charset="0"/>
-              <a:buChar char="»"/>
-              <a:defRPr sz="2000" kern="1200">
-                <a:solidFill>
-                  <a:schemeClr val="tx1"/>
-                </a:solidFill>
-                <a:latin typeface="+mn-lt"/>
-                <a:ea typeface="+mn-ea"/>
-                <a:cs typeface="+mn-cs"/>
-              </a:defRPr>
-            </a:lvl5pPr>
-            <a:lvl6pPr marL="2514600" indent="-228600" algn="l" defTabSz="914400" rtl="0" eaLnBrk="1" latinLnBrk="0" hangingPunct="1">
-              <a:spcBef>
-                <a:spcPct val="20000"/>
-              </a:spcBef>
-              <a:buFont typeface="Arial" pitchFamily="34" charset="0"/>
-              <a:buChar char="•"/>
-              <a:defRPr sz="2000" kern="1200">
-                <a:solidFill>
-                  <a:schemeClr val="tx1"/>
-                </a:solidFill>
-                <a:latin typeface="+mn-lt"/>
-                <a:ea typeface="+mn-ea"/>
-                <a:cs typeface="+mn-cs"/>
-              </a:defRPr>
-            </a:lvl6pPr>
-            <a:lvl7pPr marL="2971800" indent="-228600" algn="l" defTabSz="914400" rtl="0" eaLnBrk="1" latinLnBrk="0" hangingPunct="1">
-              <a:spcBef>
-                <a:spcPct val="20000"/>
-              </a:spcBef>
-              <a:buFont typeface="Arial" pitchFamily="34" charset="0"/>
-              <a:buChar char="•"/>
-              <a:defRPr sz="2000" kern="1200">
-                <a:solidFill>
-                  <a:schemeClr val="tx1"/>
-                </a:solidFill>
-                <a:latin typeface="+mn-lt"/>
-                <a:ea typeface="+mn-ea"/>
-                <a:cs typeface="+mn-cs"/>
-              </a:defRPr>
-            </a:lvl7pPr>
-            <a:lvl8pPr marL="3429000" indent="-228600" algn="l" defTabSz="914400" rtl="0" eaLnBrk="1" latinLnBrk="0" hangingPunct="1">
-              <a:spcBef>
-                <a:spcPct val="20000"/>
-              </a:spcBef>
-              <a:buFont typeface="Arial" pitchFamily="34" charset="0"/>
-              <a:buChar char="•"/>
-              <a:defRPr sz="2000" kern="1200">
-                <a:solidFill>
-                  <a:schemeClr val="tx1"/>
-                </a:solidFill>
-                <a:latin typeface="+mn-lt"/>
-                <a:ea typeface="+mn-ea"/>
-                <a:cs typeface="+mn-cs"/>
-              </a:defRPr>
-            </a:lvl8pPr>
-            <a:lvl9pPr marL="3886200" indent="-228600" algn="l" defTabSz="914400" rtl="0" eaLnBrk="1" latinLnBrk="0" hangingPunct="1">
-              <a:spcBef>
-                <a:spcPct val="20000"/>
-              </a:spcBef>
-              <a:buFont typeface="Arial" pitchFamily="34" charset="0"/>
-              <a:buChar char="•"/>
-              <a:defRPr sz="2000" kern="1200">
-                <a:solidFill>
-                  <a:schemeClr val="tx1"/>
-                </a:solidFill>
-                <a:latin typeface="+mn-lt"/>
-                <a:ea typeface="+mn-ea"/>
-                <a:cs typeface="+mn-cs"/>
-              </a:defRPr>
-            </a:lvl9pPr>
-          </a:lstStyle>
-          <a:p>
-            <a:pPr marL="114300" indent="0">
-              <a:buFont typeface="Arial" pitchFamily="34" charset="0"/>
-              <a:buNone/>
-            </a:pPr>
-            <a:r>
-              <a:rPr lang="pt-BR" b="1" dirty="0">
-                <a:solidFill>
-                  <a:srgbClr val="273C54"/>
-                </a:solidFill>
-                <a:latin typeface="Public Sans" panose="020B0604020202020204" charset="0"/>
-              </a:rPr>
-              <a:t>Contatos:</a:t>
-            </a:r>
-          </a:p>
-          <a:p>
-            <a:pPr marL="114300" indent="0">
-              <a:buFont typeface="Arial" pitchFamily="34" charset="0"/>
-              <a:buNone/>
-            </a:pPr>
-            <a:r>
-              <a:rPr lang="pt-BR" b="1" dirty="0">
-                <a:solidFill>
-                  <a:srgbClr val="273C54"/>
-                </a:solidFill>
-                <a:latin typeface="Public Sans" panose="020B0604020202020204" charset="0"/>
-              </a:rPr>
-              <a:t>Anderson Boa Morte</a:t>
-            </a:r>
-            <a:endParaRPr lang="pt-BR" b="1" dirty="0">
-              <a:solidFill>
-                <a:srgbClr val="273C54"/>
-              </a:solidFill>
-              <a:latin typeface="Public Sans" panose="020B0604020202020204" charset="0"/>
-              <a:hlinkClick r:id="rId3">
-                <a:extLst>
-                  <a:ext uri="{A12FA001-AC4F-418D-AE19-62706E023703}">
-                    <ahyp:hlinkClr xmlns:ahyp="http://schemas.microsoft.com/office/drawing/2018/hyperlinkcolor" val="tx"/>
-                  </a:ext>
-                </a:extLst>
-              </a:hlinkClick>
-            </a:endParaRPr>
-          </a:p>
-          <a:p>
-            <a:pPr marL="114300" indent="0">
-              <a:buFont typeface="Arial" pitchFamily="34" charset="0"/>
-              <a:buNone/>
-            </a:pPr>
-            <a:r>
-              <a:rPr lang="pt-BR" b="1" dirty="0">
-                <a:hlinkClick r:id="rId3"/>
-              </a:rPr>
-              <a:t>andersonmorte@</a:t>
-            </a:r>
-            <a:r>
-              <a:rPr lang="pt-BR" b="1" dirty="0">
-                <a:hlinkClick r:id="rId3"/>
-              </a:rPr>
-              <a:t>ufba</a:t>
-            </a:r>
-            <a:r>
-              <a:rPr lang="pt-BR" b="1" dirty="0">
-                <a:hlinkClick r:id="rId3"/>
-              </a:rPr>
-              <a:t>.br</a:t>
-            </a:r>
-            <a:endParaRPr lang="pt-BR" b="1" dirty="0"/>
-          </a:p>
-          <a:p>
-            <a:endParaRPr lang="pt-BR" dirty="0"/>
-          </a:p>
-          <a:p>
-            <a:endParaRPr lang="pt-BR" dirty="0"/>
-          </a:p>
-          <a:p>
-            <a:endParaRPr lang="pt-BR" dirty="0"/>
-          </a:p>
-          <a:p>
-            <a:endParaRPr lang="pt-BR" dirty="0"/>
+          <a:lstStyle/>
+          <a:p>
+            <a:fld id="{B6F15528-21DE-4FAA-801E-634DDDAF4B2B}" type="slidenum">
+              <a:rPr lang="en-US" smtClean="0"/>
+              <a:pPr/>
+              <a:t>9</a:t>
+            </a:fld>
+            <a:endParaRPr lang="en-US"/>
           </a:p>
         </p:txBody>
       </p:sp>
       <p:pic>
         <p:nvPicPr>
-          <p:cNvPr id="7" name="Imagem 6">
+          <p:cNvPr id="5" name="Imagem 4" descr="Uma imagem contendo Logotipo&#10;&#10;Descrição gerada automaticamente">
             <a:extLst>
               <a:ext uri="{FF2B5EF4-FFF2-40B4-BE49-F238E27FC236}">
-                <a16:creationId xmlns:a16="http://schemas.microsoft.com/office/drawing/2014/main" id="{A70207E5-DAA3-4C90-BD5B-4BBA8B7B7214}"/>
+                <a16:creationId xmlns:a16="http://schemas.microsoft.com/office/drawing/2014/main" id="{ACD5F303-8B91-FEC3-6DC7-45FDF1E5E6B1}"/>
               </a:ext>
             </a:extLst>
           </p:cNvPr>
@@ -8140,15 +8218,21 @@
           <p:nvPr/>
         </p:nvPicPr>
         <p:blipFill>
-          <a:blip r:embed="rId4"/>
+          <a:blip r:embed="rId3">
+            <a:extLst>
+              <a:ext uri="{28A0092B-C50C-407E-A947-70E740481C1C}">
+                <a14:useLocalDpi xmlns:a14="http://schemas.microsoft.com/office/drawing/2010/main" val="0"/>
+              </a:ext>
+            </a:extLst>
+          </a:blip>
           <a:stretch>
             <a:fillRect/>
           </a:stretch>
         </p:blipFill>
         <p:spPr>
           <a:xfrm>
-            <a:off x="16306800" y="7581900"/>
-            <a:ext cx="381600" cy="416933"/>
+            <a:off x="16230600" y="542544"/>
+            <a:ext cx="1892430" cy="667512"/>
           </a:xfrm>
           <a:prstGeom prst="rect">
             <a:avLst/>
@@ -8157,10 +8241,10 @@
       </p:pic>
       <p:pic>
         <p:nvPicPr>
-          <p:cNvPr id="8" name="Imagem 7">
+          <p:cNvPr id="6" name="Imagem 5" descr="Uma imagem contendo comida&#10;&#10;Descrição gerada automaticamente">
             <a:extLst>
               <a:ext uri="{FF2B5EF4-FFF2-40B4-BE49-F238E27FC236}">
-                <a16:creationId xmlns:a16="http://schemas.microsoft.com/office/drawing/2014/main" id="{D0FE850A-EBD5-4D38-A190-C0FC70D66500}"/>
+                <a16:creationId xmlns:a16="http://schemas.microsoft.com/office/drawing/2014/main" id="{F00937F2-6F8A-7F33-1939-74A7681B89B8}"/>
               </a:ext>
             </a:extLst>
           </p:cNvPr>
@@ -8170,27 +8254,123 @@
           <p:nvPr/>
         </p:nvPicPr>
         <p:blipFill>
-          <a:blip r:embed="rId5"/>
+          <a:blip r:embed="rId4">
+            <a:extLst>
+              <a:ext uri="{28A0092B-C50C-407E-A947-70E740481C1C}">
+                <a14:useLocalDpi xmlns:a14="http://schemas.microsoft.com/office/drawing/2010/main" val="0"/>
+              </a:ext>
+            </a:extLst>
+          </a:blip>
           <a:stretch>
             <a:fillRect/>
           </a:stretch>
         </p:blipFill>
         <p:spPr>
           <a:xfrm>
-            <a:off x="16303171" y="8583771"/>
-            <a:ext cx="381000" cy="381000"/>
+            <a:off x="15393885" y="428562"/>
+            <a:ext cx="676369" cy="895475"/>
           </a:xfrm>
           <a:prstGeom prst="rect">
             <a:avLst/>
           </a:prstGeom>
         </p:spPr>
       </p:pic>
+      <p:sp>
+        <p:nvSpPr>
+          <p:cNvPr id="22" name="CaixaDeTexto 21">
+            <a:hlinkClick r:id="rId5"/>
+            <a:extLst>
+              <a:ext uri="{FF2B5EF4-FFF2-40B4-BE49-F238E27FC236}">
+                <a16:creationId xmlns:a16="http://schemas.microsoft.com/office/drawing/2014/main" id="{D70E7A22-6F21-BFBB-26E2-02369BD4999C}"/>
+              </a:ext>
+            </a:extLst>
+          </p:cNvPr>
+          <p:cNvSpPr txBox="1"/>
+          <p:nvPr/>
+        </p:nvSpPr>
+        <p:spPr>
+          <a:xfrm>
+            <a:off x="748507" y="9432330"/>
+            <a:ext cx="9167446" cy="369332"/>
+          </a:xfrm>
+          <a:prstGeom prst="rect">
+            <a:avLst/>
+          </a:prstGeom>
+          <a:noFill/>
+        </p:spPr>
+        <p:txBody>
+          <a:bodyPr wrap="square">
+            <a:spAutoFit/>
+          </a:bodyPr>
+          <a:lstStyle/>
+          <a:p>
+            <a:r>
+              <a:rPr lang="pt-BR" dirty="0"/>
+              <a:t>https://github.com/abmorte/MATE34/blob/main/atividade1_regex.ipynb</a:t>
+            </a:r>
+          </a:p>
+        </p:txBody>
+      </p:sp>
+      <p:sp>
+        <p:nvSpPr>
+          <p:cNvPr id="23" name="CaixaDeTexto 22">
+            <a:extLst>
+              <a:ext uri="{FF2B5EF4-FFF2-40B4-BE49-F238E27FC236}">
+                <a16:creationId xmlns:a16="http://schemas.microsoft.com/office/drawing/2014/main" id="{FFEF963F-B7F0-5B71-3E18-D0B224EC2B43}"/>
+              </a:ext>
+            </a:extLst>
+          </p:cNvPr>
+          <p:cNvSpPr txBox="1"/>
+          <p:nvPr/>
+        </p:nvSpPr>
+        <p:spPr>
+          <a:xfrm>
+            <a:off x="685800" y="8898373"/>
+            <a:ext cx="4800600" cy="523220"/>
+          </a:xfrm>
+          <a:prstGeom prst="rect">
+            <a:avLst/>
+          </a:prstGeom>
+          <a:noFill/>
+        </p:spPr>
+        <p:txBody>
+          <a:bodyPr wrap="square">
+            <a:spAutoFit/>
+          </a:bodyPr>
+          <a:lstStyle/>
+          <a:p>
+            <a:r>
+              <a:rPr lang="pt-BR" sz="2800" b="1" dirty="0" err="1">
+                <a:solidFill>
+                  <a:schemeClr val="accent6">
+                    <a:lumMod val="75000"/>
+                  </a:schemeClr>
+                </a:solidFill>
+                <a:latin typeface="Public Sans"/>
+              </a:rPr>
+              <a:t>Github</a:t>
+            </a:r>
+            <a:r>
+              <a:rPr lang="pt-BR" sz="2800" b="1" dirty="0">
+                <a:solidFill>
+                  <a:schemeClr val="accent6">
+                    <a:lumMod val="75000"/>
+                  </a:schemeClr>
+                </a:solidFill>
+                <a:latin typeface="Public Sans"/>
+              </a:rPr>
+              <a:t>:</a:t>
+            </a:r>
+            <a:endParaRPr lang="pt-BR" sz="2800" b="1" dirty="0"/>
+          </a:p>
+        </p:txBody>
+      </p:sp>
       <p:pic>
         <p:nvPicPr>
-          <p:cNvPr id="9" name="Imagem 8">
+          <p:cNvPr id="7" name="Imagem 6" descr="Interface gráfica do usuário, Texto, Aplicativo, Email&#10;&#10;Descrição gerada automaticamente">
             <a:extLst>
               <a:ext uri="{FF2B5EF4-FFF2-40B4-BE49-F238E27FC236}">
-                <a16:creationId xmlns:a16="http://schemas.microsoft.com/office/drawing/2014/main" id="{A18D460A-10A8-41D1-B9F3-ECC47411B0C7}"/>
+                <a16:creationId xmlns:a16="http://schemas.microsoft.com/office/drawing/2014/main" id="{B2E898B7-B389-8A5E-52B7-531C41F54B33}"/>
               </a:ext>
             </a:extLst>
           </p:cNvPr>
@@ -8200,67 +8380,7 @@
           <p:nvPr/>
         </p:nvPicPr>
         <p:blipFill>
-          <a:blip r:embed="rId6"/>
-          <a:stretch>
-            <a:fillRect/>
-          </a:stretch>
-        </p:blipFill>
-        <p:spPr>
-          <a:xfrm>
-            <a:off x="16306800" y="8088732"/>
-            <a:ext cx="409575" cy="400050"/>
-          </a:xfrm>
-          <a:prstGeom prst="rect">
-            <a:avLst/>
-          </a:prstGeom>
-        </p:spPr>
-      </p:pic>
-      <p:sp>
-        <p:nvSpPr>
-          <p:cNvPr id="4" name="Espaço Reservado para Número de Slide 3">
-            <a:extLst>
-              <a:ext uri="{FF2B5EF4-FFF2-40B4-BE49-F238E27FC236}">
-                <a16:creationId xmlns:a16="http://schemas.microsoft.com/office/drawing/2014/main" id="{9DC27B37-C95B-4003-AF85-A44745CA4C1E}"/>
-              </a:ext>
-            </a:extLst>
-          </p:cNvPr>
-          <p:cNvSpPr>
-            <a:spLocks noGrp="1"/>
-          </p:cNvSpPr>
-          <p:nvPr>
-            <p:ph type="sldNum" sz="quarter" idx="12"/>
-          </p:nvPr>
-        </p:nvSpPr>
-        <p:spPr/>
-        <p:txBody>
-          <a:bodyPr/>
-          <a:lstStyle/>
-          <a:p>
-            <a:fld id="{B6F15528-21DE-4FAA-801E-634DDDAF4B2B}" type="slidenum">
-              <a:rPr lang="en-US" smtClean="0"/>
-              <a:pPr/>
-              <a:t>9</a:t>
-            </a:fld>
-            <a:endParaRPr lang="en-US"/>
-          </a:p>
-        </p:txBody>
-      </p:sp>
-      <p:pic>
-        <p:nvPicPr>
-          <p:cNvPr id="12" name="Imagem 11" descr="Uma imagem contendo Logotipo&#10;&#10;Descrição gerada automaticamente">
-            <a:extLst>
-              <a:ext uri="{FF2B5EF4-FFF2-40B4-BE49-F238E27FC236}">
-                <a16:creationId xmlns:a16="http://schemas.microsoft.com/office/drawing/2014/main" id="{815A2B97-202A-36B3-8E17-8112F2C0075A}"/>
-              </a:ext>
-            </a:extLst>
-          </p:cNvPr>
-          <p:cNvPicPr>
-            <a:picLocks noChangeAspect="1"/>
-          </p:cNvPicPr>
-          <p:nvPr/>
-        </p:nvPicPr>
-        <p:blipFill>
-          <a:blip r:embed="rId7">
+          <a:blip r:embed="rId6">
             <a:extLst>
               <a:ext uri="{28A0092B-C50C-407E-A947-70E740481C1C}">
                 <a14:useLocalDpi xmlns:a14="http://schemas.microsoft.com/office/drawing/2010/main" val="0"/>
@@ -8273,44 +8393,8 @@
         </p:blipFill>
         <p:spPr>
           <a:xfrm>
-            <a:off x="16230600" y="542544"/>
-            <a:ext cx="1892430" cy="667512"/>
-          </a:xfrm>
-          <a:prstGeom prst="rect">
-            <a:avLst/>
-          </a:prstGeom>
-        </p:spPr>
-      </p:pic>
-      <p:pic>
-        <p:nvPicPr>
-          <p:cNvPr id="14" name="Imagem 13" descr="Uma imagem contendo comida&#10;&#10;Descrição gerada automaticamente">
-            <a:extLst>
-              <a:ext uri="{FF2B5EF4-FFF2-40B4-BE49-F238E27FC236}">
-                <a16:creationId xmlns:a16="http://schemas.microsoft.com/office/drawing/2014/main" id="{C8218462-DD50-5653-03F4-D378ED850A96}"/>
-              </a:ext>
-            </a:extLst>
-          </p:cNvPr>
-          <p:cNvPicPr>
-            <a:picLocks noChangeAspect="1"/>
-          </p:cNvPicPr>
-          <p:nvPr/>
-        </p:nvPicPr>
-        <p:blipFill>
-          <a:blip r:embed="rId8">
-            <a:extLst>
-              <a:ext uri="{28A0092B-C50C-407E-A947-70E740481C1C}">
-                <a14:useLocalDpi xmlns:a14="http://schemas.microsoft.com/office/drawing/2010/main" val="0"/>
-              </a:ext>
-            </a:extLst>
-          </a:blip>
-          <a:stretch>
-            <a:fillRect/>
-          </a:stretch>
-        </p:blipFill>
-        <p:spPr>
-          <a:xfrm>
-            <a:off x="15393885" y="428562"/>
-            <a:ext cx="676369" cy="895475"/>
+            <a:off x="709246" y="1795928"/>
+            <a:ext cx="14987954" cy="7125924"/>
           </a:xfrm>
           <a:prstGeom prst="rect">
             <a:avLst/>
@@ -8320,7 +8404,7 @@
     </p:spTree>
     <p:extLst>
       <p:ext uri="{BB962C8B-B14F-4D97-AF65-F5344CB8AC3E}">
-        <p14:creationId xmlns:p14="http://schemas.microsoft.com/office/powerpoint/2010/main" val="755002959"/>
+        <p14:creationId xmlns:p14="http://schemas.microsoft.com/office/powerpoint/2010/main" val="866469971"/>
       </p:ext>
     </p:extLst>
   </p:cSld>

</xml_diff>